<commit_message>
new theme (created by auxilium)
</commit_message>
<xml_diff>
--- a/doc/pix/pix.pptx
+++ b/doc/pix/pix.pptx
@@ -7,6 +7,8 @@
   <p:sldIdLst>
     <p:sldId id="257" r:id="rId2"/>
     <p:sldId id="258" r:id="rId3"/>
+    <p:sldId id="259" r:id="rId4"/>
+    <p:sldId id="260" r:id="rId5"/>
   </p:sldIdLst>
   <p:sldSz cx="12192000" cy="6858000"/>
   <p:notesSz cx="6858000" cy="9144000"/>
@@ -262,7 +264,7 @@
           <a:p>
             <a:fld id="{D22FDC58-B528-EA48-9363-FD29E8AF6EE2}" type="datetimeFigureOut">
               <a:rPr lang="en-US" smtClean="0"/>
-              <a:t>8/28/19</a:t>
+              <a:t>9/30/21</a:t>
             </a:fld>
             <a:endParaRPr lang="en-US"/>
           </a:p>
@@ -437,7 +439,7 @@
           <a:p>
             <a:fld id="{D22FDC58-B528-EA48-9363-FD29E8AF6EE2}" type="datetimeFigureOut">
               <a:rPr lang="en-US" smtClean="0"/>
-              <a:t>8/28/19</a:t>
+              <a:t>9/30/21</a:t>
             </a:fld>
             <a:endParaRPr lang="en-US"/>
           </a:p>
@@ -622,7 +624,7 @@
           <a:p>
             <a:fld id="{D22FDC58-B528-EA48-9363-FD29E8AF6EE2}" type="datetimeFigureOut">
               <a:rPr lang="en-US" smtClean="0"/>
-              <a:t>8/28/19</a:t>
+              <a:t>9/30/21</a:t>
             </a:fld>
             <a:endParaRPr lang="en-US"/>
           </a:p>
@@ -797,7 +799,7 @@
           <a:p>
             <a:fld id="{D22FDC58-B528-EA48-9363-FD29E8AF6EE2}" type="datetimeFigureOut">
               <a:rPr lang="en-US" smtClean="0"/>
-              <a:t>8/28/19</a:t>
+              <a:t>9/30/21</a:t>
             </a:fld>
             <a:endParaRPr lang="en-US"/>
           </a:p>
@@ -1077,7 +1079,7 @@
           <a:p>
             <a:fld id="{D22FDC58-B528-EA48-9363-FD29E8AF6EE2}" type="datetimeFigureOut">
               <a:rPr lang="en-US" smtClean="0"/>
-              <a:t>8/28/19</a:t>
+              <a:t>9/30/21</a:t>
             </a:fld>
             <a:endParaRPr lang="en-US"/>
           </a:p>
@@ -1295,7 +1297,7 @@
           <a:p>
             <a:fld id="{D22FDC58-B528-EA48-9363-FD29E8AF6EE2}" type="datetimeFigureOut">
               <a:rPr lang="en-US" smtClean="0"/>
-              <a:t>8/28/19</a:t>
+              <a:t>9/30/21</a:t>
             </a:fld>
             <a:endParaRPr lang="en-US"/>
           </a:p>
@@ -1668,7 +1670,7 @@
           <a:p>
             <a:fld id="{D22FDC58-B528-EA48-9363-FD29E8AF6EE2}" type="datetimeFigureOut">
               <a:rPr lang="en-US" smtClean="0"/>
-              <a:t>8/28/19</a:t>
+              <a:t>9/30/21</a:t>
             </a:fld>
             <a:endParaRPr lang="en-US"/>
           </a:p>
@@ -1810,7 +1812,7 @@
           <a:p>
             <a:fld id="{D22FDC58-B528-EA48-9363-FD29E8AF6EE2}" type="datetimeFigureOut">
               <a:rPr lang="en-US" smtClean="0"/>
-              <a:t>8/28/19</a:t>
+              <a:t>9/30/21</a:t>
             </a:fld>
             <a:endParaRPr lang="en-US"/>
           </a:p>
@@ -1923,7 +1925,7 @@
           <a:p>
             <a:fld id="{D22FDC58-B528-EA48-9363-FD29E8AF6EE2}" type="datetimeFigureOut">
               <a:rPr lang="en-US" smtClean="0"/>
-              <a:t>8/28/19</a:t>
+              <a:t>9/30/21</a:t>
             </a:fld>
             <a:endParaRPr lang="en-US"/>
           </a:p>
@@ -2215,7 +2217,7 @@
           <a:p>
             <a:fld id="{D22FDC58-B528-EA48-9363-FD29E8AF6EE2}" type="datetimeFigureOut">
               <a:rPr lang="en-US" smtClean="0"/>
-              <a:t>8/28/19</a:t>
+              <a:t>9/30/21</a:t>
             </a:fld>
             <a:endParaRPr lang="en-US"/>
           </a:p>
@@ -2508,7 +2510,7 @@
           <a:p>
             <a:fld id="{D22FDC58-B528-EA48-9363-FD29E8AF6EE2}" type="datetimeFigureOut">
               <a:rPr lang="en-US" smtClean="0"/>
-              <a:t>8/28/19</a:t>
+              <a:t>9/30/21</a:t>
             </a:fld>
             <a:endParaRPr lang="en-US"/>
           </a:p>
@@ -2726,7 +2728,7 @@
           <a:p>
             <a:fld id="{D22FDC58-B528-EA48-9363-FD29E8AF6EE2}" type="datetimeFigureOut">
               <a:rPr lang="en-US" smtClean="0"/>
-              <a:t>8/28/19</a:t>
+              <a:t>9/30/21</a:t>
             </a:fld>
             <a:endParaRPr lang="en-US"/>
           </a:p>
@@ -3188,7 +3190,7 @@
             </a:solidFill>
             <a:ln w="28575">
               <a:solidFill>
-                <a:schemeClr val="tx1"/>
+                <a:srgbClr val="5F5F5F"/>
               </a:solidFill>
             </a:ln>
           </p:spPr>
@@ -3216,7 +3218,7 @@
               <a:r>
                 <a:rPr lang="en-US" sz="1400" dirty="0">
                   <a:solidFill>
-                    <a:schemeClr val="tx1"/>
+                    <a:srgbClr val="5F5F5F"/>
                   </a:solidFill>
                   <a:latin typeface="Monaco" pitchFamily="2" charset="0"/>
                 </a:rPr>
@@ -3250,7 +3252,7 @@
             </a:solidFill>
             <a:ln w="28575">
               <a:solidFill>
-                <a:schemeClr val="tx1"/>
+                <a:srgbClr val="5F5F5F"/>
               </a:solidFill>
             </a:ln>
           </p:spPr>
@@ -3278,7 +3280,7 @@
               <a:r>
                 <a:rPr lang="en-US" sz="1400" dirty="0">
                   <a:solidFill>
-                    <a:schemeClr val="tx1"/>
+                    <a:srgbClr val="5F5F5F"/>
                   </a:solidFill>
                   <a:latin typeface="Monaco" pitchFamily="2" charset="0"/>
                 </a:rPr>
@@ -3308,7 +3310,7 @@
               <a:avLst/>
             </a:prstGeom>
             <a:solidFill>
-              <a:schemeClr val="tx1"/>
+              <a:srgbClr val="5F5F5F"/>
             </a:solidFill>
             <a:ln>
               <a:noFill/>
@@ -3364,7 +3366,7 @@
             </a:solidFill>
             <a:ln w="28575">
               <a:solidFill>
-                <a:schemeClr val="tx1"/>
+                <a:srgbClr val="5F5F5F"/>
               </a:solidFill>
             </a:ln>
           </p:spPr>
@@ -3392,11 +3394,23 @@
               <a:r>
                 <a:rPr lang="en-US" sz="1400" dirty="0">
                   <a:solidFill>
-                    <a:schemeClr val="tx1"/>
+                    <a:srgbClr val="5F5F5F"/>
                   </a:solidFill>
                   <a:latin typeface="Monaco" pitchFamily="2" charset="0"/>
                 </a:rPr>
-                <a:t>tests links docs and code</a:t>
+                <a:t>tests link</a:t>
+              </a:r>
+            </a:p>
+            <a:p>
+              <a:pPr algn="ctr"/>
+              <a:r>
+                <a:rPr lang="en-US" sz="1400" dirty="0">
+                  <a:solidFill>
+                    <a:srgbClr val="5F5F5F"/>
+                  </a:solidFill>
+                  <a:latin typeface="Monaco" pitchFamily="2" charset="0"/>
+                </a:rPr>
+                <a:t> docs and code</a:t>
               </a:r>
             </a:p>
           </p:txBody>
@@ -3689,6 +3703,280 @@
     <p:extLst>
       <p:ext uri="{BB962C8B-B14F-4D97-AF65-F5344CB8AC3E}">
         <p14:creationId xmlns:p14="http://schemas.microsoft.com/office/powerpoint/2010/main" val="2093152156"/>
+      </p:ext>
+    </p:extLst>
+  </p:cSld>
+  <p:clrMapOvr>
+    <a:masterClrMapping/>
+  </p:clrMapOvr>
+</p:sld>
+</file>
+
+<file path=ppt/slides/slide3.xml><?xml version="1.0" encoding="utf-8"?>
+<p:sld xmlns:a="http://schemas.openxmlformats.org/drawingml/2006/main" xmlns:r="http://schemas.openxmlformats.org/officeDocument/2006/relationships" xmlns:p="http://schemas.openxmlformats.org/presentationml/2006/main">
+  <p:cSld>
+    <p:bg>
+      <p:bgPr>
+        <a:solidFill>
+          <a:schemeClr val="bg1">
+            <a:alpha val="0"/>
+          </a:schemeClr>
+        </a:solidFill>
+        <a:effectLst/>
+      </p:bgPr>
+    </p:bg>
+    <p:spTree>
+      <p:nvGrpSpPr>
+        <p:cNvPr id="1" name=""/>
+        <p:cNvGrpSpPr/>
+        <p:nvPr/>
+      </p:nvGrpSpPr>
+      <p:grpSpPr>
+        <a:xfrm>
+          <a:off x="0" y="0"/>
+          <a:ext cx="0" cy="0"/>
+          <a:chOff x="0" y="0"/>
+          <a:chExt cx="0" cy="0"/>
+        </a:xfrm>
+      </p:grpSpPr>
+      <p:sp>
+        <p:nvSpPr>
+          <p:cNvPr id="2" name="Textfeld 1">
+            <a:extLst>
+              <a:ext uri="{FF2B5EF4-FFF2-40B4-BE49-F238E27FC236}">
+                <a16:creationId xmlns:a16="http://schemas.microsoft.com/office/drawing/2014/main" id="{770E699E-343F-784C-A39A-B2B73ED1A9BA}"/>
+              </a:ext>
+            </a:extLst>
+          </p:cNvPr>
+          <p:cNvSpPr txBox="1"/>
+          <p:nvPr/>
+        </p:nvSpPr>
+        <p:spPr>
+          <a:xfrm>
+            <a:off x="3097423" y="1790918"/>
+            <a:ext cx="5766322" cy="2215991"/>
+          </a:xfrm>
+          <a:prstGeom prst="rect">
+            <a:avLst/>
+          </a:prstGeom>
+          <a:noFill/>
+        </p:spPr>
+        <p:txBody>
+          <a:bodyPr wrap="none" rtlCol="0">
+            <a:spAutoFit/>
+            <a:scene3d>
+              <a:camera prst="orthographicFront"/>
+              <a:lightRig rig="threePt" dir="t"/>
+            </a:scene3d>
+            <a:sp3d extrusionH="57150">
+              <a:bevelT w="69850" h="69850" prst="divot"/>
+            </a:sp3d>
+          </a:bodyPr>
+          <a:lstStyle/>
+          <a:p>
+            <a:r>
+              <a:rPr lang="de-DE" sz="13800" b="1" spc="-300" dirty="0" err="1">
+                <a:gradFill flip="none" rotWithShape="1">
+                  <a:gsLst>
+                    <a:gs pos="0">
+                      <a:srgbClr val="FFFC00"/>
+                    </a:gs>
+                    <a:gs pos="50000">
+                      <a:srgbClr val="FFD579">
+                        <a:lumMod val="67000"/>
+                        <a:alpha val="8000"/>
+                      </a:srgbClr>
+                    </a:gs>
+                    <a:gs pos="100000">
+                      <a:srgbClr val="5F5F5F">
+                        <a:tint val="23500"/>
+                        <a:satMod val="160000"/>
+                      </a:srgbClr>
+                    </a:gs>
+                  </a:gsLst>
+                  <a:lin ang="2700000" scaled="1"/>
+                  <a:tileRect/>
+                </a:gradFill>
+                <a:effectLst>
+                  <a:outerShdw blurRad="63500" sx="102000" sy="102000" algn="ctr" rotWithShape="0">
+                    <a:prstClr val="black">
+                      <a:alpha val="40000"/>
+                    </a:prstClr>
+                  </a:outerShdw>
+                </a:effectLst>
+                <a:latin typeface="HGMaruGothicMPRO" panose="020F0600000000000000" pitchFamily="34" charset="-128"/>
+                <a:ea typeface="HGMaruGothicMPRO" panose="020F0600000000000000" pitchFamily="34" charset="-128"/>
+              </a:rPr>
+              <a:t>au</a:t>
+            </a:r>
+            <a:r>
+              <a:rPr lang="de-DE" sz="13800" b="1" spc="-300" baseline="-25000" dirty="0" err="1">
+                <a:gradFill flip="none" rotWithShape="1">
+                  <a:gsLst>
+                    <a:gs pos="0">
+                      <a:srgbClr val="FFFC00"/>
+                    </a:gs>
+                    <a:gs pos="50000">
+                      <a:srgbClr val="FFD579">
+                        <a:lumMod val="67000"/>
+                        <a:alpha val="8000"/>
+                      </a:srgbClr>
+                    </a:gs>
+                    <a:gs pos="100000">
+                      <a:srgbClr val="5F5F5F">
+                        <a:tint val="23500"/>
+                        <a:satMod val="160000"/>
+                      </a:srgbClr>
+                    </a:gs>
+                  </a:gsLst>
+                  <a:lin ang="2700000" scaled="1"/>
+                  <a:tileRect/>
+                </a:gradFill>
+                <a:effectLst>
+                  <a:outerShdw blurRad="63500" sx="102000" sy="102000" algn="ctr" rotWithShape="0">
+                    <a:prstClr val="black">
+                      <a:alpha val="40000"/>
+                    </a:prstClr>
+                  </a:outerShdw>
+                </a:effectLst>
+                <a:latin typeface="HGMaruGothicMPRO" panose="020F0600000000000000" pitchFamily="34" charset="-128"/>
+                <a:ea typeface="HGMaruGothicMPRO" panose="020F0600000000000000" pitchFamily="34" charset="-128"/>
+              </a:rPr>
+              <a:t>Xilium</a:t>
+            </a:r>
+            <a:endParaRPr lang="de-DE" sz="13800" b="1" spc="-300" baseline="-25000" dirty="0">
+              <a:gradFill flip="none" rotWithShape="1">
+                <a:gsLst>
+                  <a:gs pos="0">
+                    <a:srgbClr val="FFFC00"/>
+                  </a:gs>
+                  <a:gs pos="50000">
+                    <a:srgbClr val="FFD579">
+                      <a:lumMod val="67000"/>
+                      <a:alpha val="8000"/>
+                    </a:srgbClr>
+                  </a:gs>
+                  <a:gs pos="100000">
+                    <a:srgbClr val="5F5F5F">
+                      <a:tint val="23500"/>
+                      <a:satMod val="160000"/>
+                    </a:srgbClr>
+                  </a:gs>
+                </a:gsLst>
+                <a:lin ang="2700000" scaled="1"/>
+                <a:tileRect/>
+              </a:gradFill>
+              <a:effectLst>
+                <a:outerShdw blurRad="63500" sx="102000" sy="102000" algn="ctr" rotWithShape="0">
+                  <a:prstClr val="black">
+                    <a:alpha val="40000"/>
+                  </a:prstClr>
+                </a:outerShdw>
+              </a:effectLst>
+              <a:latin typeface="HGMaruGothicMPRO" panose="020F0600000000000000" pitchFamily="34" charset="-128"/>
+              <a:ea typeface="HGMaruGothicMPRO" panose="020F0600000000000000" pitchFamily="34" charset="-128"/>
+            </a:endParaRPr>
+          </a:p>
+        </p:txBody>
+      </p:sp>
+    </p:spTree>
+    <p:extLst>
+      <p:ext uri="{BB962C8B-B14F-4D97-AF65-F5344CB8AC3E}">
+        <p14:creationId xmlns:p14="http://schemas.microsoft.com/office/powerpoint/2010/main" val="1541807135"/>
+      </p:ext>
+    </p:extLst>
+  </p:cSld>
+  <p:clrMapOvr>
+    <a:masterClrMapping/>
+  </p:clrMapOvr>
+</p:sld>
+</file>
+
+<file path=ppt/slides/slide4.xml><?xml version="1.0" encoding="utf-8"?>
+<p:sld xmlns:a="http://schemas.openxmlformats.org/drawingml/2006/main" xmlns:r="http://schemas.openxmlformats.org/officeDocument/2006/relationships" xmlns:p="http://schemas.openxmlformats.org/presentationml/2006/main">
+  <p:cSld>
+    <p:spTree>
+      <p:nvGrpSpPr>
+        <p:cNvPr id="1" name=""/>
+        <p:cNvGrpSpPr/>
+        <p:nvPr/>
+      </p:nvGrpSpPr>
+      <p:grpSpPr>
+        <a:xfrm>
+          <a:off x="0" y="0"/>
+          <a:ext cx="0" cy="0"/>
+          <a:chOff x="0" y="0"/>
+          <a:chExt cx="0" cy="0"/>
+        </a:xfrm>
+      </p:grpSpPr>
+      <p:sp>
+        <p:nvSpPr>
+          <p:cNvPr id="2" name="Textfeld 1">
+            <a:extLst>
+              <a:ext uri="{FF2B5EF4-FFF2-40B4-BE49-F238E27FC236}">
+                <a16:creationId xmlns:a16="http://schemas.microsoft.com/office/drawing/2014/main" id="{F3B26176-2024-E041-85B6-24115F7E9E23}"/>
+              </a:ext>
+            </a:extLst>
+          </p:cNvPr>
+          <p:cNvSpPr txBox="1"/>
+          <p:nvPr/>
+        </p:nvSpPr>
+        <p:spPr>
+          <a:xfrm>
+            <a:off x="2397178" y="2225616"/>
+            <a:ext cx="7561685" cy="2308324"/>
+          </a:xfrm>
+          <a:prstGeom prst="rect">
+            <a:avLst/>
+          </a:prstGeom>
+          <a:noFill/>
+        </p:spPr>
+        <p:txBody>
+          <a:bodyPr wrap="none" rtlCol="0">
+            <a:spAutoFit/>
+          </a:bodyPr>
+          <a:lstStyle/>
+          <a:p>
+            <a:r>
+              <a:rPr lang="de-DE" sz="14400" dirty="0">
+                <a:solidFill>
+                  <a:srgbClr val="5F5F5F"/>
+                </a:solidFill>
+                <a:latin typeface="SF Compact Rounded Ultralight" pitchFamily="2" charset="77"/>
+              </a:rPr>
+              <a:t>􀤽</a:t>
+            </a:r>
+            <a:r>
+              <a:rPr lang="de-DE" sz="14400" dirty="0" err="1">
+                <a:solidFill>
+                  <a:srgbClr val="5F5F5F"/>
+                </a:solidFill>
+                <a:latin typeface="SF Compact Rounded Light" pitchFamily="2" charset="77"/>
+              </a:rPr>
+              <a:t>au</a:t>
+            </a:r>
+            <a:r>
+              <a:rPr lang="de-DE" sz="14400" baseline="-15000" dirty="0" err="1">
+                <a:solidFill>
+                  <a:srgbClr val="5F5F5F"/>
+                </a:solidFill>
+                <a:latin typeface="SF Compact Rounded Ultralight" pitchFamily="2" charset="77"/>
+              </a:rPr>
+              <a:t>Xilium</a:t>
+            </a:r>
+            <a:endParaRPr lang="de-DE" sz="14400" baseline="-15000" dirty="0">
+              <a:solidFill>
+                <a:srgbClr val="5F5F5F"/>
+              </a:solidFill>
+              <a:latin typeface="SF Compact Rounded Ultralight" pitchFamily="2" charset="77"/>
+            </a:endParaRPr>
+          </a:p>
+        </p:txBody>
+      </p:sp>
+    </p:spTree>
+    <p:extLst>
+      <p:ext uri="{BB962C8B-B14F-4D97-AF65-F5344CB8AC3E}">
+        <p14:creationId xmlns:p14="http://schemas.microsoft.com/office/powerpoint/2010/main" val="2920784343"/>
       </p:ext>
     </p:extLst>
   </p:cSld>

</xml_diff>

<commit_message>
Commit build (created by auxilium)
</commit_message>
<xml_diff>
--- a/doc/pix/pix.pptx
+++ b/doc/pix/pix.pptx
@@ -9,6 +9,7 @@
     <p:sldId id="258" r:id="rId3"/>
     <p:sldId id="259" r:id="rId4"/>
     <p:sldId id="260" r:id="rId5"/>
+    <p:sldId id="261" r:id="rId6"/>
   </p:sldIdLst>
   <p:sldSz cx="12192000" cy="6858000"/>
   <p:notesSz cx="6858000" cy="9144000"/>
@@ -264,7 +265,7 @@
           <a:p>
             <a:fld id="{D22FDC58-B528-EA48-9363-FD29E8AF6EE2}" type="datetimeFigureOut">
               <a:rPr lang="en-US" smtClean="0"/>
-              <a:t>9/30/21</a:t>
+              <a:t>10/1/21</a:t>
             </a:fld>
             <a:endParaRPr lang="en-US"/>
           </a:p>
@@ -439,7 +440,7 @@
           <a:p>
             <a:fld id="{D22FDC58-B528-EA48-9363-FD29E8AF6EE2}" type="datetimeFigureOut">
               <a:rPr lang="en-US" smtClean="0"/>
-              <a:t>9/30/21</a:t>
+              <a:t>10/1/21</a:t>
             </a:fld>
             <a:endParaRPr lang="en-US"/>
           </a:p>
@@ -624,7 +625,7 @@
           <a:p>
             <a:fld id="{D22FDC58-B528-EA48-9363-FD29E8AF6EE2}" type="datetimeFigureOut">
               <a:rPr lang="en-US" smtClean="0"/>
-              <a:t>9/30/21</a:t>
+              <a:t>10/1/21</a:t>
             </a:fld>
             <a:endParaRPr lang="en-US"/>
           </a:p>
@@ -799,7 +800,7 @@
           <a:p>
             <a:fld id="{D22FDC58-B528-EA48-9363-FD29E8AF6EE2}" type="datetimeFigureOut">
               <a:rPr lang="en-US" smtClean="0"/>
-              <a:t>9/30/21</a:t>
+              <a:t>10/1/21</a:t>
             </a:fld>
             <a:endParaRPr lang="en-US"/>
           </a:p>
@@ -1079,7 +1080,7 @@
           <a:p>
             <a:fld id="{D22FDC58-B528-EA48-9363-FD29E8AF6EE2}" type="datetimeFigureOut">
               <a:rPr lang="en-US" smtClean="0"/>
-              <a:t>9/30/21</a:t>
+              <a:t>10/1/21</a:t>
             </a:fld>
             <a:endParaRPr lang="en-US"/>
           </a:p>
@@ -1297,7 +1298,7 @@
           <a:p>
             <a:fld id="{D22FDC58-B528-EA48-9363-FD29E8AF6EE2}" type="datetimeFigureOut">
               <a:rPr lang="en-US" smtClean="0"/>
-              <a:t>9/30/21</a:t>
+              <a:t>10/1/21</a:t>
             </a:fld>
             <a:endParaRPr lang="en-US"/>
           </a:p>
@@ -1670,7 +1671,7 @@
           <a:p>
             <a:fld id="{D22FDC58-B528-EA48-9363-FD29E8AF6EE2}" type="datetimeFigureOut">
               <a:rPr lang="en-US" smtClean="0"/>
-              <a:t>9/30/21</a:t>
+              <a:t>10/1/21</a:t>
             </a:fld>
             <a:endParaRPr lang="en-US"/>
           </a:p>
@@ -1812,7 +1813,7 @@
           <a:p>
             <a:fld id="{D22FDC58-B528-EA48-9363-FD29E8AF6EE2}" type="datetimeFigureOut">
               <a:rPr lang="en-US" smtClean="0"/>
-              <a:t>9/30/21</a:t>
+              <a:t>10/1/21</a:t>
             </a:fld>
             <a:endParaRPr lang="en-US"/>
           </a:p>
@@ -1925,7 +1926,7 @@
           <a:p>
             <a:fld id="{D22FDC58-B528-EA48-9363-FD29E8AF6EE2}" type="datetimeFigureOut">
               <a:rPr lang="en-US" smtClean="0"/>
-              <a:t>9/30/21</a:t>
+              <a:t>10/1/21</a:t>
             </a:fld>
             <a:endParaRPr lang="en-US"/>
           </a:p>
@@ -2217,7 +2218,7 @@
           <a:p>
             <a:fld id="{D22FDC58-B528-EA48-9363-FD29E8AF6EE2}" type="datetimeFigureOut">
               <a:rPr lang="en-US" smtClean="0"/>
-              <a:t>9/30/21</a:t>
+              <a:t>10/1/21</a:t>
             </a:fld>
             <a:endParaRPr lang="en-US"/>
           </a:p>
@@ -2510,7 +2511,7 @@
           <a:p>
             <a:fld id="{D22FDC58-B528-EA48-9363-FD29E8AF6EE2}" type="datetimeFigureOut">
               <a:rPr lang="en-US" smtClean="0"/>
-              <a:t>9/30/21</a:t>
+              <a:t>10/1/21</a:t>
             </a:fld>
             <a:endParaRPr lang="en-US"/>
           </a:p>
@@ -2728,7 +2729,7 @@
           <a:p>
             <a:fld id="{D22FDC58-B528-EA48-9363-FD29E8AF6EE2}" type="datetimeFigureOut">
               <a:rPr lang="en-US" smtClean="0"/>
-              <a:t>9/30/21</a:t>
+              <a:t>10/1/21</a:t>
             </a:fld>
             <a:endParaRPr lang="en-US"/>
           </a:p>
@@ -3986,6 +3987,203 @@
 </p:sld>
 </file>
 
+<file path=ppt/slides/slide5.xml><?xml version="1.0" encoding="utf-8"?>
+<p:sld xmlns:a="http://schemas.openxmlformats.org/drawingml/2006/main" xmlns:r="http://schemas.openxmlformats.org/officeDocument/2006/relationships" xmlns:p="http://schemas.openxmlformats.org/presentationml/2006/main">
+  <p:cSld>
+    <p:spTree>
+      <p:nvGrpSpPr>
+        <p:cNvPr id="1" name=""/>
+        <p:cNvGrpSpPr/>
+        <p:nvPr/>
+      </p:nvGrpSpPr>
+      <p:grpSpPr>
+        <a:xfrm>
+          <a:off x="0" y="0"/>
+          <a:ext cx="0" cy="0"/>
+          <a:chOff x="0" y="0"/>
+          <a:chExt cx="0" cy="0"/>
+        </a:xfrm>
+      </p:grpSpPr>
+      <p:grpSp>
+        <p:nvGrpSpPr>
+          <p:cNvPr id="4" name="Gruppieren 3">
+            <a:extLst>
+              <a:ext uri="{FF2B5EF4-FFF2-40B4-BE49-F238E27FC236}">
+                <a16:creationId xmlns:a16="http://schemas.microsoft.com/office/drawing/2014/main" id="{8087246F-DF56-BF43-82D5-B43928C067BA}"/>
+              </a:ext>
+            </a:extLst>
+          </p:cNvPr>
+          <p:cNvGrpSpPr/>
+          <p:nvPr/>
+        </p:nvGrpSpPr>
+        <p:grpSpPr>
+          <a:xfrm>
+            <a:off x="3366317" y="1621766"/>
+            <a:ext cx="7211008" cy="3170099"/>
+            <a:chOff x="3366317" y="2173658"/>
+            <a:chExt cx="5819610" cy="2558414"/>
+          </a:xfrm>
+        </p:grpSpPr>
+        <p:sp>
+          <p:nvSpPr>
+            <p:cNvPr id="2" name="Rechteck 1">
+              <a:extLst>
+                <a:ext uri="{FF2B5EF4-FFF2-40B4-BE49-F238E27FC236}">
+                  <a16:creationId xmlns:a16="http://schemas.microsoft.com/office/drawing/2014/main" id="{D8D50C76-51A3-5346-B418-BBC8C86580C2}"/>
+                </a:ext>
+              </a:extLst>
+            </p:cNvPr>
+            <p:cNvSpPr/>
+            <p:nvPr/>
+          </p:nvSpPr>
+          <p:spPr>
+            <a:xfrm>
+              <a:off x="3366317" y="2173658"/>
+              <a:ext cx="2431113" cy="2558414"/>
+            </a:xfrm>
+            <a:prstGeom prst="rect">
+              <a:avLst/>
+            </a:prstGeom>
+          </p:spPr>
+          <p:txBody>
+            <a:bodyPr wrap="none">
+              <a:spAutoFit/>
+            </a:bodyPr>
+            <a:lstStyle/>
+            <a:p>
+              <a:r>
+                <a:rPr lang="de-DE" sz="20000" dirty="0">
+                  <a:solidFill>
+                    <a:srgbClr val="5F5F5F"/>
+                  </a:solidFill>
+                  <a:latin typeface="SF Pro" pitchFamily="2" charset="0"/>
+                </a:rPr>
+                <a:t>􀆿</a:t>
+              </a:r>
+              <a:endParaRPr lang="de-DE" sz="20000" dirty="0">
+                <a:solidFill>
+                  <a:srgbClr val="5F5F5F"/>
+                </a:solidFill>
+                <a:effectLst/>
+                <a:latin typeface="SF Pro" pitchFamily="2" charset="0"/>
+              </a:endParaRPr>
+            </a:p>
+          </p:txBody>
+        </p:sp>
+        <p:sp>
+          <p:nvSpPr>
+            <p:cNvPr id="3" name="Textfeld 2">
+              <a:extLst>
+                <a:ext uri="{FF2B5EF4-FFF2-40B4-BE49-F238E27FC236}">
+                  <a16:creationId xmlns:a16="http://schemas.microsoft.com/office/drawing/2014/main" id="{15A0E9A3-1561-834D-BF25-397A53EC43A1}"/>
+                </a:ext>
+              </a:extLst>
+            </p:cNvPr>
+            <p:cNvSpPr txBox="1"/>
+            <p:nvPr/>
+          </p:nvSpPr>
+          <p:spPr>
+            <a:xfrm>
+              <a:off x="5098883" y="3679015"/>
+              <a:ext cx="4087044" cy="745169"/>
+            </a:xfrm>
+            <a:prstGeom prst="rect">
+              <a:avLst/>
+            </a:prstGeom>
+            <a:noFill/>
+          </p:spPr>
+          <p:txBody>
+            <a:bodyPr wrap="none" rtlCol="0">
+              <a:spAutoFit/>
+            </a:bodyPr>
+            <a:lstStyle/>
+            <a:p>
+              <a:r>
+                <a:rPr lang="de-DE" sz="5400" baseline="-15000" dirty="0" err="1">
+                  <a:solidFill>
+                    <a:srgbClr val="5F5F5F"/>
+                  </a:solidFill>
+                  <a:latin typeface="SF Compact Rounded Ultralight" pitchFamily="2" charset="77"/>
+                </a:rPr>
+                <a:t>made</a:t>
+              </a:r>
+              <a:r>
+                <a:rPr lang="de-DE" sz="5400" baseline="-15000" dirty="0">
+                  <a:solidFill>
+                    <a:srgbClr val="5F5F5F"/>
+                  </a:solidFill>
+                  <a:latin typeface="SF Compact Rounded Ultralight" pitchFamily="2" charset="77"/>
+                </a:rPr>
+                <a:t> </a:t>
+              </a:r>
+              <a:r>
+                <a:rPr lang="de-DE" sz="5400" baseline="-15000" dirty="0" err="1">
+                  <a:solidFill>
+                    <a:srgbClr val="5F5F5F"/>
+                  </a:solidFill>
+                  <a:latin typeface="SF Compact Rounded Ultralight" pitchFamily="2" charset="77"/>
+                </a:rPr>
+                <a:t>with</a:t>
+              </a:r>
+              <a:r>
+                <a:rPr lang="de-DE" sz="5400" baseline="-15000" dirty="0">
+                  <a:solidFill>
+                    <a:srgbClr val="5F5F5F"/>
+                  </a:solidFill>
+                  <a:latin typeface="SF Compact Rounded Ultralight" pitchFamily="2" charset="77"/>
+                </a:rPr>
+                <a:t> </a:t>
+              </a:r>
+              <a:r>
+                <a:rPr lang="de-DE" sz="5400" dirty="0">
+                  <a:solidFill>
+                    <a:srgbClr val="5F5F5F"/>
+                  </a:solidFill>
+                  <a:latin typeface="SF Compact Rounded Ultralight" pitchFamily="2" charset="77"/>
+                </a:rPr>
+                <a:t>􀤽</a:t>
+              </a:r>
+              <a:r>
+                <a:rPr lang="de-DE" sz="5400" dirty="0" err="1">
+                  <a:solidFill>
+                    <a:srgbClr val="5F5F5F"/>
+                  </a:solidFill>
+                  <a:latin typeface="SF Compact Rounded Light" pitchFamily="2" charset="77"/>
+                </a:rPr>
+                <a:t>au</a:t>
+              </a:r>
+              <a:r>
+                <a:rPr lang="de-DE" sz="5400" baseline="-15000" dirty="0" err="1">
+                  <a:solidFill>
+                    <a:srgbClr val="5F5F5F"/>
+                  </a:solidFill>
+                  <a:latin typeface="SF Compact Rounded Ultralight" pitchFamily="2" charset="77"/>
+                </a:rPr>
+                <a:t>Xilium</a:t>
+              </a:r>
+              <a:endParaRPr lang="de-DE" sz="5400" baseline="30000" dirty="0">
+                <a:solidFill>
+                  <a:srgbClr val="5F5F5F"/>
+                </a:solidFill>
+                <a:latin typeface="SF Compact Rounded Ultralight" pitchFamily="2" charset="77"/>
+              </a:endParaRPr>
+            </a:p>
+          </p:txBody>
+        </p:sp>
+      </p:grpSp>
+    </p:spTree>
+    <p:extLst>
+      <p:ext uri="{BB962C8B-B14F-4D97-AF65-F5344CB8AC3E}">
+        <p14:creationId xmlns:p14="http://schemas.microsoft.com/office/powerpoint/2010/main" val="2103160019"/>
+      </p:ext>
+    </p:extLst>
+  </p:cSld>
+  <p:clrMapOvr>
+    <a:masterClrMapping/>
+  </p:clrMapOvr>
+</p:sld>
+</file>
+
 <file path=ppt/theme/theme1.xml><?xml version="1.0" encoding="utf-8"?>
 <a:theme xmlns:a="http://schemas.openxmlformats.org/drawingml/2006/main" name="Office">
   <a:themeElements>

</xml_diff>